<commit_message>
Minor update to the slides
</commit_message>
<xml_diff>
--- a/slides/Blazor.pptx
+++ b/slides/Blazor.pptx
@@ -5259,7 +5259,7 @@
           <a:p>
             <a:fld id="{ED5A1D9D-3338-4137-95E3-7DB2CFE52734}" type="datetimeFigureOut">
               <a:rPr lang="en-US" smtClean="0"/>
-              <a:t>9/13/2019</a:t>
+              <a:t>4/10/2020</a:t>
             </a:fld>
             <a:endParaRPr lang="en-US"/>
           </a:p>
@@ -9393,6 +9393,14 @@
           <a:bodyPr/>
           <a:lstStyle/>
           <a:p>
+            <a:r>
+              <a:rPr lang="en-US" dirty="0"/>
+              <a:t>Extending </a:t>
+            </a:r>
+            <a:r>
+              <a:rPr lang="en-US"/>
+              <a:t>the Microsoft Demos</a:t>
+            </a:r>
             <a:endParaRPr lang="en-US" dirty="0"/>
           </a:p>
         </p:txBody>

</xml_diff>